<commit_message>
updaed self made ppt
</commit_message>
<xml_diff>
--- a/PPT.pptx
+++ b/PPT.pptx
@@ -234,7 +234,7 @@
           <a:p>
             <a:fld id="{762B48F5-BACC-47D6-A0F7-82FBF9C6BC85}" type="datetimeFigureOut">
               <a:rPr lang="en-US"/>
-              <a:t>9/9/2023</a:t>
+              <a:t>3/4/2024</a:t>
             </a:fld>
             <a:endParaRPr/>
           </a:p>
@@ -399,7 +399,7 @@
           <a:p>
             <a:fld id="{0CB1CD00-5424-4675-AB18-2C419B060449}" type="datetimeFigureOut">
               <a:rPr lang="en-US"/>
-              <a:t>9/9/2023</a:t>
+              <a:t>3/4/2024</a:t>
             </a:fld>
             <a:endParaRPr/>
           </a:p>
@@ -914,13 +914,13 @@
   <p:clrMapOvr>
     <a:masterClrMapping/>
   </p:clrMapOvr>
-  <mc:AlternateContent xmlns:mc="http://schemas.openxmlformats.org/markup-compatibility/2006">
-    <mc:Choice xmlns:p14="http://schemas.microsoft.com/office/powerpoint/2010/main" Requires="p14">
+  <mc:AlternateContent xmlns:mc="http://schemas.openxmlformats.org/markup-compatibility/2006" xmlns:p14="http://schemas.microsoft.com/office/powerpoint/2010/main">
+    <mc:Choice Requires="p14">
       <p:transition spd="slow" p14:dur="1500">
         <p:random/>
       </p:transition>
     </mc:Choice>
-    <mc:Fallback>
+    <mc:Fallback xmlns="">
       <p:transition spd="slow">
         <p:random/>
       </p:transition>
@@ -1056,7 +1056,7 @@
           <a:p>
             <a:fld id="{37CC0096-1860-4642-9CD2-0079EA5E7CD1}" type="datetimeFigureOut">
               <a:rPr lang="en-US" smtClean="0"/>
-              <a:t>9/9/2023</a:t>
+              <a:t>3/4/2024</a:t>
             </a:fld>
             <a:endParaRPr lang="en-US"/>
           </a:p>
@@ -1095,13 +1095,13 @@
   <p:clrMapOvr>
     <a:masterClrMapping/>
   </p:clrMapOvr>
-  <mc:AlternateContent xmlns:mc="http://schemas.openxmlformats.org/markup-compatibility/2006">
-    <mc:Choice xmlns:p14="http://schemas.microsoft.com/office/powerpoint/2010/main" Requires="p14">
+  <mc:AlternateContent xmlns:mc="http://schemas.openxmlformats.org/markup-compatibility/2006" xmlns:p14="http://schemas.microsoft.com/office/powerpoint/2010/main">
+    <mc:Choice Requires="p14">
       <p:transition spd="slow" p14:dur="1500">
         <p:random/>
       </p:transition>
     </mc:Choice>
-    <mc:Fallback>
+    <mc:Fallback xmlns="">
       <p:transition spd="slow">
         <p:random/>
       </p:transition>
@@ -1247,7 +1247,7 @@
           <a:p>
             <a:fld id="{37CC0096-1860-4642-9CD2-0079EA5E7CD1}" type="datetimeFigureOut">
               <a:rPr lang="en-US" smtClean="0"/>
-              <a:t>9/9/2023</a:t>
+              <a:t>3/4/2024</a:t>
             </a:fld>
             <a:endParaRPr lang="en-US"/>
           </a:p>
@@ -1286,13 +1286,13 @@
   <p:clrMapOvr>
     <a:masterClrMapping/>
   </p:clrMapOvr>
-  <mc:AlternateContent xmlns:mc="http://schemas.openxmlformats.org/markup-compatibility/2006">
-    <mc:Choice xmlns:p14="http://schemas.microsoft.com/office/powerpoint/2010/main" Requires="p14">
+  <mc:AlternateContent xmlns:mc="http://schemas.openxmlformats.org/markup-compatibility/2006" xmlns:p14="http://schemas.microsoft.com/office/powerpoint/2010/main">
+    <mc:Choice Requires="p14">
       <p:transition spd="slow" p14:dur="1500">
         <p:random/>
       </p:transition>
     </mc:Choice>
-    <mc:Fallback>
+    <mc:Fallback xmlns="">
       <p:transition spd="slow">
         <p:random/>
       </p:transition>
@@ -1334,7 +1334,7 @@
           <a:lstStyle/>
           <a:p>
             <a:r>
-              <a:rPr lang="en-US"/>
+              <a:rPr lang="en-US" dirty="0"/>
               <a:t>Click to edit Master title style</a:t>
             </a:r>
           </a:p>
@@ -1350,7 +1350,12 @@
             <p:ph idx="1"/>
           </p:nvPr>
         </p:nvSpPr>
-        <p:spPr/>
+        <p:spPr>
+          <a:xfrm>
+            <a:off x="1524000" y="1820813"/>
+            <a:ext cx="9144000" cy="4267200"/>
+          </a:xfrm>
+        </p:spPr>
         <p:txBody>
           <a:bodyPr/>
           <a:lstStyle>
@@ -1361,38 +1366,37 @@
           <a:p>
             <a:pPr lvl="0"/>
             <a:r>
-              <a:rPr lang="en-US"/>
+              <a:rPr lang="en-US" dirty="0"/>
               <a:t>Click to edit Master text styles</a:t>
             </a:r>
           </a:p>
           <a:p>
             <a:pPr lvl="1"/>
             <a:r>
-              <a:rPr lang="en-US"/>
+              <a:rPr lang="en-US" dirty="0"/>
               <a:t>Second level</a:t>
             </a:r>
           </a:p>
           <a:p>
             <a:pPr lvl="2"/>
             <a:r>
-              <a:rPr lang="en-US"/>
+              <a:rPr lang="en-US" dirty="0"/>
               <a:t>Third level</a:t>
             </a:r>
           </a:p>
           <a:p>
             <a:pPr lvl="3"/>
             <a:r>
-              <a:rPr lang="en-US"/>
+              <a:rPr lang="en-US" dirty="0"/>
               <a:t>Fourth level</a:t>
             </a:r>
           </a:p>
           <a:p>
             <a:pPr lvl="4"/>
             <a:r>
-              <a:rPr lang="en-US"/>
+              <a:rPr lang="en-US" dirty="0"/>
               <a:t>Fifth level</a:t>
             </a:r>
-            <a:endParaRPr lang="en-US" dirty="0"/>
           </a:p>
         </p:txBody>
       </p:sp>
@@ -1432,7 +1436,7 @@
           <a:p>
             <a:fld id="{37CC0096-1860-4642-9CD2-0079EA5E7CD1}" type="datetimeFigureOut">
               <a:rPr lang="en-US" smtClean="0"/>
-              <a:t>9/9/2023</a:t>
+              <a:t>3/4/2024</a:t>
             </a:fld>
             <a:endParaRPr lang="en-US"/>
           </a:p>
@@ -1461,6 +1465,47 @@
           </a:p>
         </p:txBody>
       </p:sp>
+      <p:sp>
+        <p:nvSpPr>
+          <p:cNvPr id="9" name="TextBox 8">
+            <a:extLst>
+              <a:ext uri="{FF2B5EF4-FFF2-40B4-BE49-F238E27FC236}">
+                <a16:creationId xmlns:a16="http://schemas.microsoft.com/office/drawing/2014/main" id="{7AAA1D37-DE4D-CFE0-FBF7-7698A9E06025}"/>
+              </a:ext>
+            </a:extLst>
+          </p:cNvPr>
+          <p:cNvSpPr txBox="1"/>
+          <p:nvPr userDrawn="1"/>
+        </p:nvSpPr>
+        <p:spPr>
+          <a:xfrm rot="20527931">
+            <a:off x="4104320" y="1978181"/>
+            <a:ext cx="6590037" cy="1015663"/>
+          </a:xfrm>
+          <a:prstGeom prst="rect">
+            <a:avLst/>
+          </a:prstGeom>
+          <a:noFill/>
+        </p:spPr>
+        <p:txBody>
+          <a:bodyPr wrap="square" rtlCol="0">
+            <a:spAutoFit/>
+          </a:bodyPr>
+          <a:lstStyle/>
+          <a:p>
+            <a:r>
+              <a:rPr lang="en-IN" sz="6000" dirty="0">
+                <a:solidFill>
+                  <a:schemeClr val="tx2">
+                    <a:lumMod val="25000"/>
+                  </a:schemeClr>
+                </a:solidFill>
+              </a:rPr>
+              <a:t>Vishvajeet Singh</a:t>
+            </a:r>
+          </a:p>
+        </p:txBody>
+      </p:sp>
     </p:spTree>
     <p:extLst>
       <p:ext uri="{BB962C8B-B14F-4D97-AF65-F5344CB8AC3E}">
@@ -1471,13 +1516,13 @@
   <p:clrMapOvr>
     <a:masterClrMapping/>
   </p:clrMapOvr>
-  <mc:AlternateContent xmlns:mc="http://schemas.openxmlformats.org/markup-compatibility/2006">
-    <mc:Choice xmlns:p14="http://schemas.microsoft.com/office/powerpoint/2010/main" Requires="p14">
+  <mc:AlternateContent xmlns:mc="http://schemas.openxmlformats.org/markup-compatibility/2006" xmlns:p14="http://schemas.microsoft.com/office/powerpoint/2010/main">
+    <mc:Choice Requires="p14">
       <p:transition spd="slow" p14:dur="1500">
         <p:random/>
       </p:transition>
     </mc:Choice>
-    <mc:Fallback>
+    <mc:Fallback xmlns="">
       <p:transition spd="slow">
         <p:random/>
       </p:transition>
@@ -1625,13 +1670,13 @@
   <p:clrMapOvr>
     <a:masterClrMapping/>
   </p:clrMapOvr>
-  <mc:AlternateContent xmlns:mc="http://schemas.openxmlformats.org/markup-compatibility/2006">
-    <mc:Choice xmlns:p14="http://schemas.microsoft.com/office/powerpoint/2010/main" Requires="p14">
+  <mc:AlternateContent xmlns:mc="http://schemas.openxmlformats.org/markup-compatibility/2006" xmlns:p14="http://schemas.microsoft.com/office/powerpoint/2010/main">
+    <mc:Choice Requires="p14">
       <p:transition spd="slow" p14:dur="1500">
         <p:random/>
       </p:transition>
     </mc:Choice>
-    <mc:Fallback>
+    <mc:Fallback xmlns="">
       <p:transition spd="slow">
         <p:random/>
       </p:transition>
@@ -1889,7 +1934,7 @@
           <a:p>
             <a:fld id="{37CC0096-1860-4642-9CD2-0079EA5E7CD1}" type="datetimeFigureOut">
               <a:rPr lang="en-US" smtClean="0"/>
-              <a:t>9/9/2023</a:t>
+              <a:t>3/4/2024</a:t>
             </a:fld>
             <a:endParaRPr lang="en-US"/>
           </a:p>
@@ -1928,13 +1973,13 @@
   <p:clrMapOvr>
     <a:masterClrMapping/>
   </p:clrMapOvr>
-  <mc:AlternateContent xmlns:mc="http://schemas.openxmlformats.org/markup-compatibility/2006">
-    <mc:Choice xmlns:p14="http://schemas.microsoft.com/office/powerpoint/2010/main" Requires="p14">
+  <mc:AlternateContent xmlns:mc="http://schemas.openxmlformats.org/markup-compatibility/2006" xmlns:p14="http://schemas.microsoft.com/office/powerpoint/2010/main">
+    <mc:Choice Requires="p14">
       <p:transition spd="slow" p14:dur="1500">
         <p:random/>
       </p:transition>
     </mc:Choice>
-    <mc:Fallback>
+    <mc:Fallback xmlns="">
       <p:transition spd="slow">
         <p:random/>
       </p:transition>
@@ -2340,7 +2385,7 @@
           <a:p>
             <a:fld id="{37CC0096-1860-4642-9CD2-0079EA5E7CD1}" type="datetimeFigureOut">
               <a:rPr lang="en-US" smtClean="0"/>
-              <a:t>9/9/2023</a:t>
+              <a:t>3/4/2024</a:t>
             </a:fld>
             <a:endParaRPr lang="en-US"/>
           </a:p>
@@ -2379,13 +2424,13 @@
   <p:clrMapOvr>
     <a:masterClrMapping/>
   </p:clrMapOvr>
-  <mc:AlternateContent xmlns:mc="http://schemas.openxmlformats.org/markup-compatibility/2006">
-    <mc:Choice xmlns:p14="http://schemas.microsoft.com/office/powerpoint/2010/main" Requires="p14">
+  <mc:AlternateContent xmlns:mc="http://schemas.openxmlformats.org/markup-compatibility/2006" xmlns:p14="http://schemas.microsoft.com/office/powerpoint/2010/main">
+    <mc:Choice Requires="p14">
       <p:transition spd="slow" p14:dur="1500">
         <p:random/>
       </p:transition>
     </mc:Choice>
-    <mc:Fallback>
+    <mc:Fallback xmlns="">
       <p:transition spd="slow">
         <p:random/>
       </p:transition>
@@ -2469,7 +2514,7 @@
           <a:p>
             <a:fld id="{37CC0096-1860-4642-9CD2-0079EA5E7CD1}" type="datetimeFigureOut">
               <a:rPr lang="en-US" smtClean="0"/>
-              <a:t>9/9/2023</a:t>
+              <a:t>3/4/2024</a:t>
             </a:fld>
             <a:endParaRPr lang="en-US"/>
           </a:p>
@@ -2508,13 +2553,13 @@
   <p:clrMapOvr>
     <a:masterClrMapping/>
   </p:clrMapOvr>
-  <mc:AlternateContent xmlns:mc="http://schemas.openxmlformats.org/markup-compatibility/2006">
-    <mc:Choice xmlns:p14="http://schemas.microsoft.com/office/powerpoint/2010/main" Requires="p14">
+  <mc:AlternateContent xmlns:mc="http://schemas.openxmlformats.org/markup-compatibility/2006" xmlns:p14="http://schemas.microsoft.com/office/powerpoint/2010/main">
+    <mc:Choice Requires="p14">
       <p:transition spd="slow" p14:dur="1500">
         <p:random/>
       </p:transition>
     </mc:Choice>
-    <mc:Fallback>
+    <mc:Fallback xmlns="">
       <p:transition spd="slow">
         <p:random/>
       </p:transition>
@@ -2576,7 +2621,7 @@
           <a:p>
             <a:fld id="{37CC0096-1860-4642-9CD2-0079EA5E7CD1}" type="datetimeFigureOut">
               <a:rPr lang="en-US" smtClean="0"/>
-              <a:t>9/9/2023</a:t>
+              <a:t>3/4/2024</a:t>
             </a:fld>
             <a:endParaRPr lang="en-US"/>
           </a:p>
@@ -2615,13 +2660,13 @@
   <p:clrMapOvr>
     <a:masterClrMapping/>
   </p:clrMapOvr>
-  <mc:AlternateContent xmlns:mc="http://schemas.openxmlformats.org/markup-compatibility/2006">
-    <mc:Choice xmlns:p14="http://schemas.microsoft.com/office/powerpoint/2010/main" Requires="p14">
+  <mc:AlternateContent xmlns:mc="http://schemas.openxmlformats.org/markup-compatibility/2006" xmlns:p14="http://schemas.microsoft.com/office/powerpoint/2010/main">
+    <mc:Choice Requires="p14">
       <p:transition spd="slow" p14:dur="1500">
         <p:random/>
       </p:transition>
     </mc:Choice>
-    <mc:Fallback>
+    <mc:Fallback xmlns="">
       <p:transition spd="slow">
         <p:random/>
       </p:transition>
@@ -2872,7 +2917,7 @@
           <a:p>
             <a:fld id="{37CC0096-1860-4642-9CD2-0079EA5E7CD1}" type="datetimeFigureOut">
               <a:rPr lang="en-US" smtClean="0"/>
-              <a:t>9/9/2023</a:t>
+              <a:t>3/4/2024</a:t>
             </a:fld>
             <a:endParaRPr lang="en-US"/>
           </a:p>
@@ -2911,13 +2956,13 @@
   <p:clrMapOvr>
     <a:masterClrMapping/>
   </p:clrMapOvr>
-  <mc:AlternateContent xmlns:mc="http://schemas.openxmlformats.org/markup-compatibility/2006">
-    <mc:Choice xmlns:p14="http://schemas.microsoft.com/office/powerpoint/2010/main" Requires="p14">
+  <mc:AlternateContent xmlns:mc="http://schemas.openxmlformats.org/markup-compatibility/2006" xmlns:p14="http://schemas.microsoft.com/office/powerpoint/2010/main">
+    <mc:Choice Requires="p14">
       <p:transition spd="slow" p14:dur="1500">
         <p:random/>
       </p:transition>
     </mc:Choice>
-    <mc:Fallback>
+    <mc:Fallback xmlns="">
       <p:transition spd="slow">
         <p:random/>
       </p:transition>
@@ -3195,7 +3240,7 @@
           <a:p>
             <a:fld id="{37CC0096-1860-4642-9CD2-0079EA5E7CD1}" type="datetimeFigureOut">
               <a:rPr lang="en-US" smtClean="0"/>
-              <a:t>9/9/2023</a:t>
+              <a:t>3/4/2024</a:t>
             </a:fld>
             <a:endParaRPr lang="en-US"/>
           </a:p>
@@ -3234,13 +3279,13 @@
   <p:clrMapOvr>
     <a:masterClrMapping/>
   </p:clrMapOvr>
-  <mc:AlternateContent xmlns:mc="http://schemas.openxmlformats.org/markup-compatibility/2006">
-    <mc:Choice xmlns:p14="http://schemas.microsoft.com/office/powerpoint/2010/main" Requires="p14">
+  <mc:AlternateContent xmlns:mc="http://schemas.openxmlformats.org/markup-compatibility/2006" xmlns:p14="http://schemas.microsoft.com/office/powerpoint/2010/main">
+    <mc:Choice Requires="p14">
       <p:transition spd="slow" p14:dur="1500">
         <p:random/>
       </p:transition>
     </mc:Choice>
-    <mc:Fallback>
+    <mc:Fallback xmlns="">
       <p:transition spd="slow">
         <p:random/>
       </p:transition>
@@ -3439,7 +3484,7 @@
             <a:fld id="{37CC0096-1860-4642-9CD2-0079EA5E7CD1}" type="datetimeFigureOut">
               <a:rPr lang="en-US" smtClean="0"/>
               <a:pPr/>
-              <a:t>9/9/2023</a:t>
+              <a:t>3/4/2024</a:t>
             </a:fld>
             <a:endParaRPr lang="en-US"/>
           </a:p>
@@ -3487,6 +3532,47 @@
           </a:p>
         </p:txBody>
       </p:sp>
+      <p:sp>
+        <p:nvSpPr>
+          <p:cNvPr id="7" name="TextBox 6">
+            <a:extLst>
+              <a:ext uri="{FF2B5EF4-FFF2-40B4-BE49-F238E27FC236}">
+                <a16:creationId xmlns:a16="http://schemas.microsoft.com/office/drawing/2014/main" id="{DE5F1959-8EE1-260F-3C07-05F58B89C3C0}"/>
+              </a:ext>
+            </a:extLst>
+          </p:cNvPr>
+          <p:cNvSpPr txBox="1"/>
+          <p:nvPr userDrawn="1"/>
+        </p:nvSpPr>
+        <p:spPr>
+          <a:xfrm rot="20771180">
+            <a:off x="4497760" y="2564904"/>
+            <a:ext cx="7694240" cy="1015663"/>
+          </a:xfrm>
+          <a:prstGeom prst="rect">
+            <a:avLst/>
+          </a:prstGeom>
+          <a:noFill/>
+        </p:spPr>
+        <p:txBody>
+          <a:bodyPr wrap="square" rtlCol="0">
+            <a:spAutoFit/>
+          </a:bodyPr>
+          <a:lstStyle/>
+          <a:p>
+            <a:r>
+              <a:rPr lang="en-IN" sz="6000" dirty="0">
+                <a:solidFill>
+                  <a:schemeClr val="tx2">
+                    <a:lumMod val="25000"/>
+                  </a:schemeClr>
+                </a:solidFill>
+              </a:rPr>
+              <a:t>Vishvajeet Singh</a:t>
+            </a:r>
+          </a:p>
+        </p:txBody>
+      </p:sp>
     </p:spTree>
     <p:extLst>
       <p:ext uri="{BB962C8B-B14F-4D97-AF65-F5344CB8AC3E}">
@@ -3508,13 +3594,13 @@
     <p:sldLayoutId id="2147483658" r:id="rId10"/>
     <p:sldLayoutId id="2147483659" r:id="rId11"/>
   </p:sldLayoutIdLst>
-  <mc:AlternateContent xmlns:mc="http://schemas.openxmlformats.org/markup-compatibility/2006">
-    <mc:Choice xmlns:p14="http://schemas.microsoft.com/office/powerpoint/2010/main" Requires="p14">
+  <mc:AlternateContent xmlns:mc="http://schemas.openxmlformats.org/markup-compatibility/2006" xmlns:p14="http://schemas.microsoft.com/office/powerpoint/2010/main">
+    <mc:Choice Requires="p14">
       <p:transition spd="slow" p14:dur="1500">
         <p:random/>
       </p:transition>
     </mc:Choice>
-    <mc:Fallback>
+    <mc:Fallback xmlns="">
       <p:transition spd="slow">
         <p:random/>
       </p:transition>
@@ -3933,13 +4019,13 @@
   <p:clrMapOvr>
     <a:masterClrMapping/>
   </p:clrMapOvr>
-  <mc:AlternateContent xmlns:mc="http://schemas.openxmlformats.org/markup-compatibility/2006">
-    <mc:Choice xmlns:p14="http://schemas.microsoft.com/office/powerpoint/2010/main" Requires="p14">
+  <mc:AlternateContent xmlns:mc="http://schemas.openxmlformats.org/markup-compatibility/2006" xmlns:p14="http://schemas.microsoft.com/office/powerpoint/2010/main">
+    <mc:Choice Requires="p14">
       <p:transition spd="slow" p14:dur="1500">
         <p:random/>
       </p:transition>
     </mc:Choice>
-    <mc:Fallback>
+    <mc:Fallback xmlns="">
       <p:transition spd="slow">
         <p:random/>
       </p:transition>
@@ -4248,13 +4334,13 @@
   <p:clrMapOvr>
     <a:masterClrMapping/>
   </p:clrMapOvr>
-  <mc:AlternateContent xmlns:mc="http://schemas.openxmlformats.org/markup-compatibility/2006">
-    <mc:Choice xmlns:p14="http://schemas.microsoft.com/office/powerpoint/2010/main" Requires="p14">
+  <mc:AlternateContent xmlns:mc="http://schemas.openxmlformats.org/markup-compatibility/2006" xmlns:p14="http://schemas.microsoft.com/office/powerpoint/2010/main">
+    <mc:Choice Requires="p14">
       <p:transition spd="slow" p14:dur="1500">
         <p:random/>
       </p:transition>
     </mc:Choice>
-    <mc:Fallback>
+    <mc:Fallback xmlns="">
       <p:transition spd="slow">
         <p:random/>
       </p:transition>
@@ -4721,13 +4807,13 @@
   <p:clrMapOvr>
     <a:masterClrMapping/>
   </p:clrMapOvr>
-  <mc:AlternateContent xmlns:mc="http://schemas.openxmlformats.org/markup-compatibility/2006">
-    <mc:Choice xmlns:p14="http://schemas.microsoft.com/office/powerpoint/2010/main" Requires="p14">
+  <mc:AlternateContent xmlns:mc="http://schemas.openxmlformats.org/markup-compatibility/2006" xmlns:p14="http://schemas.microsoft.com/office/powerpoint/2010/main">
+    <mc:Choice Requires="p14">
       <p:transition spd="slow" p14:dur="1500">
         <p:random/>
       </p:transition>
     </mc:Choice>
-    <mc:Fallback>
+    <mc:Fallback xmlns="">
       <p:transition spd="slow">
         <p:random/>
       </p:transition>
@@ -5253,13 +5339,13 @@
   <p:clrMapOvr>
     <a:masterClrMapping/>
   </p:clrMapOvr>
-  <mc:AlternateContent xmlns:mc="http://schemas.openxmlformats.org/markup-compatibility/2006">
-    <mc:Choice xmlns:p14="http://schemas.microsoft.com/office/powerpoint/2010/main" Requires="p14">
+  <mc:AlternateContent xmlns:mc="http://schemas.openxmlformats.org/markup-compatibility/2006" xmlns:p14="http://schemas.microsoft.com/office/powerpoint/2010/main">
+    <mc:Choice Requires="p14">
       <p:transition spd="slow" p14:dur="1500">
         <p:random/>
       </p:transition>
     </mc:Choice>
-    <mc:Fallback>
+    <mc:Fallback xmlns="">
       <p:transition spd="slow">
         <p:random/>
       </p:transition>
@@ -5764,13 +5850,13 @@
   <p:clrMapOvr>
     <a:masterClrMapping/>
   </p:clrMapOvr>
-  <mc:AlternateContent xmlns:mc="http://schemas.openxmlformats.org/markup-compatibility/2006">
-    <mc:Choice xmlns:p14="http://schemas.microsoft.com/office/powerpoint/2010/main" Requires="p14">
+  <mc:AlternateContent xmlns:mc="http://schemas.openxmlformats.org/markup-compatibility/2006" xmlns:p14="http://schemas.microsoft.com/office/powerpoint/2010/main">
+    <mc:Choice Requires="p14">
       <p:transition spd="slow" p14:dur="1500">
         <p:random/>
       </p:transition>
     </mc:Choice>
-    <mc:Fallback>
+    <mc:Fallback xmlns="">
       <p:transition spd="slow">
         <p:random/>
       </p:transition>
@@ -6553,13 +6639,13 @@
   <p:clrMapOvr>
     <a:masterClrMapping/>
   </p:clrMapOvr>
-  <mc:AlternateContent xmlns:mc="http://schemas.openxmlformats.org/markup-compatibility/2006">
-    <mc:Choice xmlns:p14="http://schemas.microsoft.com/office/powerpoint/2010/main" Requires="p14">
+  <mc:AlternateContent xmlns:mc="http://schemas.openxmlformats.org/markup-compatibility/2006" xmlns:p14="http://schemas.microsoft.com/office/powerpoint/2010/main">
+    <mc:Choice Requires="p14">
       <p:transition spd="slow" p14:dur="1500">
         <p:random/>
       </p:transition>
     </mc:Choice>
-    <mc:Fallback>
+    <mc:Fallback xmlns="">
       <p:transition spd="slow">
         <p:random/>
       </p:transition>
@@ -6822,13 +6908,13 @@
   <p:clrMapOvr>
     <a:masterClrMapping/>
   </p:clrMapOvr>
-  <mc:AlternateContent xmlns:mc="http://schemas.openxmlformats.org/markup-compatibility/2006">
-    <mc:Choice xmlns:p14="http://schemas.microsoft.com/office/powerpoint/2010/main" Requires="p14">
+  <mc:AlternateContent xmlns:mc="http://schemas.openxmlformats.org/markup-compatibility/2006" xmlns:p14="http://schemas.microsoft.com/office/powerpoint/2010/main">
+    <mc:Choice Requires="p14">
       <p:transition spd="slow" p14:dur="1500">
         <p:random/>
       </p:transition>
     </mc:Choice>
-    <mc:Fallback>
+    <mc:Fallback xmlns="">
       <p:transition spd="slow">
         <p:random/>
       </p:transition>
@@ -7562,13 +7648,13 @@
   <p:clrMapOvr>
     <a:masterClrMapping/>
   </p:clrMapOvr>
-  <mc:AlternateContent xmlns:mc="http://schemas.openxmlformats.org/markup-compatibility/2006">
-    <mc:Choice xmlns:p14="http://schemas.microsoft.com/office/powerpoint/2010/main" Requires="p14">
+  <mc:AlternateContent xmlns:mc="http://schemas.openxmlformats.org/markup-compatibility/2006" xmlns:p14="http://schemas.microsoft.com/office/powerpoint/2010/main">
+    <mc:Choice Requires="p14">
       <p:transition spd="slow" p14:dur="1500">
         <p:random/>
       </p:transition>
     </mc:Choice>
-    <mc:Fallback>
+    <mc:Fallback xmlns="">
       <p:transition spd="slow">
         <p:random/>
       </p:transition>
@@ -8327,13 +8413,13 @@
   <p:clrMapOvr>
     <a:masterClrMapping/>
   </p:clrMapOvr>
-  <mc:AlternateContent xmlns:mc="http://schemas.openxmlformats.org/markup-compatibility/2006">
-    <mc:Choice xmlns:p14="http://schemas.microsoft.com/office/powerpoint/2010/main" Requires="p14">
+  <mc:AlternateContent xmlns:mc="http://schemas.openxmlformats.org/markup-compatibility/2006" xmlns:p14="http://schemas.microsoft.com/office/powerpoint/2010/main">
+    <mc:Choice Requires="p14">
       <p:transition spd="slow" p14:dur="1500">
         <p:random/>
       </p:transition>
     </mc:Choice>
-    <mc:Fallback>
+    <mc:Fallback xmlns="">
       <p:transition spd="slow">
         <p:random/>
       </p:transition>
@@ -9002,13 +9088,13 @@
   <p:clrMapOvr>
     <a:masterClrMapping/>
   </p:clrMapOvr>
-  <mc:AlternateContent xmlns:mc="http://schemas.openxmlformats.org/markup-compatibility/2006">
-    <mc:Choice xmlns:p14="http://schemas.microsoft.com/office/powerpoint/2010/main" Requires="p14">
+  <mc:AlternateContent xmlns:mc="http://schemas.openxmlformats.org/markup-compatibility/2006" xmlns:p14="http://schemas.microsoft.com/office/powerpoint/2010/main">
+    <mc:Choice Requires="p14">
       <p:transition spd="slow" p14:dur="1500">
         <p:random/>
       </p:transition>
     </mc:Choice>
-    <mc:Fallback>
+    <mc:Fallback xmlns="">
       <p:transition spd="slow">
         <p:random/>
       </p:transition>
@@ -9915,13 +10001,13 @@
   <p:clrMapOvr>
     <a:masterClrMapping/>
   </p:clrMapOvr>
-  <mc:AlternateContent xmlns:mc="http://schemas.openxmlformats.org/markup-compatibility/2006">
-    <mc:Choice xmlns:p14="http://schemas.microsoft.com/office/powerpoint/2010/main" Requires="p14">
+  <mc:AlternateContent xmlns:mc="http://schemas.openxmlformats.org/markup-compatibility/2006" xmlns:p14="http://schemas.microsoft.com/office/powerpoint/2010/main">
+    <mc:Choice Requires="p14">
       <p:transition spd="slow" p14:dur="1500">
         <p:random/>
       </p:transition>
     </mc:Choice>
-    <mc:Fallback>
+    <mc:Fallback xmlns="">
       <p:transition spd="slow">
         <p:random/>
       </p:transition>
@@ -10818,13 +10904,13 @@
   <p:clrMapOvr>
     <a:masterClrMapping/>
   </p:clrMapOvr>
-  <mc:AlternateContent xmlns:mc="http://schemas.openxmlformats.org/markup-compatibility/2006">
-    <mc:Choice xmlns:p14="http://schemas.microsoft.com/office/powerpoint/2010/main" Requires="p14">
+  <mc:AlternateContent xmlns:mc="http://schemas.openxmlformats.org/markup-compatibility/2006" xmlns:p14="http://schemas.microsoft.com/office/powerpoint/2010/main">
+    <mc:Choice Requires="p14">
       <p:transition spd="slow" p14:dur="1500">
         <p:random/>
       </p:transition>
     </mc:Choice>
-    <mc:Fallback>
+    <mc:Fallback xmlns="">
       <p:transition spd="slow">
         <p:random/>
       </p:transition>
@@ -11132,13 +11218,13 @@
   <p:clrMapOvr>
     <a:masterClrMapping/>
   </p:clrMapOvr>
-  <mc:AlternateContent xmlns:mc="http://schemas.openxmlformats.org/markup-compatibility/2006">
-    <mc:Choice xmlns:p14="http://schemas.microsoft.com/office/powerpoint/2010/main" Requires="p14">
+  <mc:AlternateContent xmlns:mc="http://schemas.openxmlformats.org/markup-compatibility/2006" xmlns:p14="http://schemas.microsoft.com/office/powerpoint/2010/main">
+    <mc:Choice Requires="p14">
       <p:transition spd="slow" p14:dur="1500">
         <p:random/>
       </p:transition>
     </mc:Choice>
-    <mc:Fallback>
+    <mc:Fallback xmlns="">
       <p:transition spd="slow">
         <p:random/>
       </p:transition>
@@ -11214,13 +11300,13 @@
   <p:clrMapOvr>
     <a:masterClrMapping/>
   </p:clrMapOvr>
-  <mc:AlternateContent xmlns:mc="http://schemas.openxmlformats.org/markup-compatibility/2006">
-    <mc:Choice xmlns:p14="http://schemas.microsoft.com/office/powerpoint/2010/main" Requires="p14">
+  <mc:AlternateContent xmlns:mc="http://schemas.openxmlformats.org/markup-compatibility/2006" xmlns:p14="http://schemas.microsoft.com/office/powerpoint/2010/main">
+    <mc:Choice Requires="p14">
       <p:transition spd="slow" p14:dur="1500">
         <p:random/>
       </p:transition>
     </mc:Choice>
-    <mc:Fallback>
+    <mc:Fallback xmlns="">
       <p:transition spd="slow">
         <p:random/>
       </p:transition>
@@ -11475,13 +11561,13 @@
   <p:clrMapOvr>
     <a:masterClrMapping/>
   </p:clrMapOvr>
-  <mc:AlternateContent xmlns:mc="http://schemas.openxmlformats.org/markup-compatibility/2006">
-    <mc:Choice xmlns:p14="http://schemas.microsoft.com/office/powerpoint/2010/main" Requires="p14">
+  <mc:AlternateContent xmlns:mc="http://schemas.openxmlformats.org/markup-compatibility/2006" xmlns:p14="http://schemas.microsoft.com/office/powerpoint/2010/main">
+    <mc:Choice Requires="p14">
       <p:transition spd="slow" p14:dur="1500">
         <p:random/>
       </p:transition>
     </mc:Choice>
-    <mc:Fallback>
+    <mc:Fallback xmlns="">
       <p:transition spd="slow">
         <p:random/>
       </p:transition>
@@ -11791,13 +11877,13 @@
   <p:clrMapOvr>
     <a:masterClrMapping/>
   </p:clrMapOvr>
-  <mc:AlternateContent xmlns:mc="http://schemas.openxmlformats.org/markup-compatibility/2006">
-    <mc:Choice xmlns:p14="http://schemas.microsoft.com/office/powerpoint/2010/main" Requires="p14">
+  <mc:AlternateContent xmlns:mc="http://schemas.openxmlformats.org/markup-compatibility/2006" xmlns:p14="http://schemas.microsoft.com/office/powerpoint/2010/main">
+    <mc:Choice Requires="p14">
       <p:transition spd="slow" p14:dur="1500">
         <p:random/>
       </p:transition>
     </mc:Choice>
-    <mc:Fallback>
+    <mc:Fallback xmlns="">
       <p:transition spd="slow">
         <p:random/>
       </p:transition>
@@ -13063,13 +13149,13 @@
   <p:clrMapOvr>
     <a:masterClrMapping/>
   </p:clrMapOvr>
-  <mc:AlternateContent xmlns:mc="http://schemas.openxmlformats.org/markup-compatibility/2006">
-    <mc:Choice xmlns:p14="http://schemas.microsoft.com/office/powerpoint/2010/main" Requires="p14">
+  <mc:AlternateContent xmlns:mc="http://schemas.openxmlformats.org/markup-compatibility/2006" xmlns:p14="http://schemas.microsoft.com/office/powerpoint/2010/main">
+    <mc:Choice Requires="p14">
       <p:transition spd="slow" p14:dur="1500">
         <p:random/>
       </p:transition>
     </mc:Choice>
-    <mc:Fallback>
+    <mc:Fallback xmlns="">
       <p:transition spd="slow">
         <p:random/>
       </p:transition>
@@ -14818,13 +14904,13 @@
   <p:clrMapOvr>
     <a:masterClrMapping/>
   </p:clrMapOvr>
-  <mc:AlternateContent xmlns:mc="http://schemas.openxmlformats.org/markup-compatibility/2006">
-    <mc:Choice xmlns:p14="http://schemas.microsoft.com/office/powerpoint/2010/main" Requires="p14">
+  <mc:AlternateContent xmlns:mc="http://schemas.openxmlformats.org/markup-compatibility/2006" xmlns:p14="http://schemas.microsoft.com/office/powerpoint/2010/main">
+    <mc:Choice Requires="p14">
       <p:transition spd="slow" p14:dur="1500">
         <p:random/>
       </p:transition>
     </mc:Choice>
-    <mc:Fallback>
+    <mc:Fallback xmlns="">
       <p:transition spd="slow">
         <p:random/>
       </p:transition>
@@ -15829,13 +15915,13 @@
   <p:clrMapOvr>
     <a:masterClrMapping/>
   </p:clrMapOvr>
-  <mc:AlternateContent xmlns:mc="http://schemas.openxmlformats.org/markup-compatibility/2006">
-    <mc:Choice xmlns:p14="http://schemas.microsoft.com/office/powerpoint/2010/main" Requires="p14">
+  <mc:AlternateContent xmlns:mc="http://schemas.openxmlformats.org/markup-compatibility/2006" xmlns:p14="http://schemas.microsoft.com/office/powerpoint/2010/main">
+    <mc:Choice Requires="p14">
       <p:transition spd="slow" p14:dur="1500">
         <p:random/>
       </p:transition>
     </mc:Choice>
-    <mc:Fallback>
+    <mc:Fallback xmlns="">
       <p:transition spd="slow">
         <p:random/>
       </p:transition>
@@ -16137,13 +16223,13 @@
   <p:clrMapOvr>
     <a:masterClrMapping/>
   </p:clrMapOvr>
-  <mc:AlternateContent xmlns:mc="http://schemas.openxmlformats.org/markup-compatibility/2006">
-    <mc:Choice xmlns:p14="http://schemas.microsoft.com/office/powerpoint/2010/main" Requires="p14">
+  <mc:AlternateContent xmlns:mc="http://schemas.openxmlformats.org/markup-compatibility/2006" xmlns:p14="http://schemas.microsoft.com/office/powerpoint/2010/main">
+    <mc:Choice Requires="p14">
       <p:transition spd="slow" p14:dur="1500">
         <p:random/>
       </p:transition>
     </mc:Choice>
-    <mc:Fallback>
+    <mc:Fallback xmlns="">
       <p:transition spd="slow">
         <p:random/>
       </p:transition>
@@ -16543,13 +16629,13 @@
   <p:clrMapOvr>
     <a:masterClrMapping/>
   </p:clrMapOvr>
-  <mc:AlternateContent xmlns:mc="http://schemas.openxmlformats.org/markup-compatibility/2006">
-    <mc:Choice xmlns:p14="http://schemas.microsoft.com/office/powerpoint/2010/main" Requires="p14">
+  <mc:AlternateContent xmlns:mc="http://schemas.openxmlformats.org/markup-compatibility/2006" xmlns:p14="http://schemas.microsoft.com/office/powerpoint/2010/main">
+    <mc:Choice Requires="p14">
       <p:transition spd="slow" p14:dur="1500">
         <p:random/>
       </p:transition>
     </mc:Choice>
-    <mc:Fallback>
+    <mc:Fallback xmlns="">
       <p:transition spd="slow">
         <p:random/>
       </p:transition>

</xml_diff>